<commit_message>
fixed an error in the flowchart, updated relevant slide
</commit_message>
<xml_diff>
--- a/python_project_presentation.pptx
+++ b/python_project_presentation.pptx
@@ -112,6 +112,11 @@
       </a:defRPr>
     </a:lvl9pPr>
   </p:defaultTextStyle>
+  <p:extLst>
+    <p:ext uri="{EFAFB233-063F-42B5-8137-9DF3F51BA10A}">
+      <p15:sldGuideLst xmlns:p15="http://schemas.microsoft.com/office/powerpoint/2012/main"/>
+    </p:ext>
+  </p:extLst>
 </p:presentation>
 </file>
 
@@ -340,7 +345,7 @@
             <a:fld id="{B61BEF0D-F0BB-DE4B-95CE-6DB70DBA9567}" type="datetimeFigureOut">
               <a:rPr lang="en-US" dirty="0"/>
               <a:pPr/>
-              <a:t>10/23/2024</a:t>
+              <a:t>10/24/2024</a:t>
             </a:fld>
             <a:endParaRPr lang="en-US" dirty="0"/>
           </a:p>
@@ -671,7 +676,7 @@
             <a:fld id="{B61BEF0D-F0BB-DE4B-95CE-6DB70DBA9567}" type="datetimeFigureOut">
               <a:rPr lang="en-US" dirty="0"/>
               <a:pPr/>
-              <a:t>10/23/2024</a:t>
+              <a:t>10/24/2024</a:t>
             </a:fld>
             <a:endParaRPr lang="en-US" dirty="0"/>
           </a:p>
@@ -946,7 +951,7 @@
             <a:fld id="{B61BEF0D-F0BB-DE4B-95CE-6DB70DBA9567}" type="datetimeFigureOut">
               <a:rPr lang="en-US" dirty="0"/>
               <a:pPr/>
-              <a:t>10/23/2024</a:t>
+              <a:t>10/24/2024</a:t>
             </a:fld>
             <a:endParaRPr lang="en-US" dirty="0"/>
           </a:p>
@@ -1511,7 +1516,7 @@
             <a:fld id="{B61BEF0D-F0BB-DE4B-95CE-6DB70DBA9567}" type="datetimeFigureOut">
               <a:rPr lang="en-US" dirty="0"/>
               <a:pPr/>
-              <a:t>10/23/2024</a:t>
+              <a:t>10/24/2024</a:t>
             </a:fld>
             <a:endParaRPr lang="en-US" dirty="0"/>
           </a:p>
@@ -1786,7 +1791,7 @@
             <a:fld id="{B61BEF0D-F0BB-DE4B-95CE-6DB70DBA9567}" type="datetimeFigureOut">
               <a:rPr lang="en-US" dirty="0"/>
               <a:pPr/>
-              <a:t>10/23/2024</a:t>
+              <a:t>10/24/2024</a:t>
             </a:fld>
             <a:endParaRPr lang="en-US" dirty="0"/>
           </a:p>
@@ -2345,7 +2350,7 @@
             <a:fld id="{B61BEF0D-F0BB-DE4B-95CE-6DB70DBA9567}" type="datetimeFigureOut">
               <a:rPr lang="en-US" dirty="0"/>
               <a:pPr/>
-              <a:t>10/23/2024</a:t>
+              <a:t>10/24/2024</a:t>
             </a:fld>
             <a:endParaRPr lang="en-US" dirty="0"/>
           </a:p>
@@ -2669,7 +2674,7 @@
             <a:fld id="{B61BEF0D-F0BB-DE4B-95CE-6DB70DBA9567}" type="datetimeFigureOut">
               <a:rPr lang="en-US" dirty="0"/>
               <a:pPr/>
-              <a:t>10/23/2024</a:t>
+              <a:t>10/24/2024</a:t>
             </a:fld>
             <a:endParaRPr lang="en-US" dirty="0"/>
           </a:p>
@@ -2871,7 +2876,7 @@
             <a:fld id="{B61BEF0D-F0BB-DE4B-95CE-6DB70DBA9567}" type="datetimeFigureOut">
               <a:rPr lang="en-US" dirty="0"/>
               <a:pPr/>
-              <a:t>10/23/2024</a:t>
+              <a:t>10/24/2024</a:t>
             </a:fld>
             <a:endParaRPr lang="en-US" dirty="0"/>
           </a:p>
@@ -3078,7 +3083,7 @@
             <a:fld id="{B61BEF0D-F0BB-DE4B-95CE-6DB70DBA9567}" type="datetimeFigureOut">
               <a:rPr lang="en-US" dirty="0"/>
               <a:pPr/>
-              <a:t>10/23/2024</a:t>
+              <a:t>10/24/2024</a:t>
             </a:fld>
             <a:endParaRPr lang="en-US" dirty="0"/>
           </a:p>
@@ -3275,7 +3280,7 @@
             <a:fld id="{B61BEF0D-F0BB-DE4B-95CE-6DB70DBA9567}" type="datetimeFigureOut">
               <a:rPr lang="en-US" dirty="0"/>
               <a:pPr/>
-              <a:t>10/23/2024</a:t>
+              <a:t>10/24/2024</a:t>
             </a:fld>
             <a:endParaRPr lang="en-US" dirty="0"/>
           </a:p>
@@ -3548,7 +3553,7 @@
             <a:fld id="{B61BEF0D-F0BB-DE4B-95CE-6DB70DBA9567}" type="datetimeFigureOut">
               <a:rPr lang="en-US" dirty="0"/>
               <a:pPr/>
-              <a:t>10/23/2024</a:t>
+              <a:t>10/24/2024</a:t>
             </a:fld>
             <a:endParaRPr lang="en-US" dirty="0"/>
           </a:p>
@@ -3811,7 +3816,7 @@
             <a:fld id="{B61BEF0D-F0BB-DE4B-95CE-6DB70DBA9567}" type="datetimeFigureOut">
               <a:rPr lang="en-US" dirty="0"/>
               <a:pPr/>
-              <a:t>10/23/2024</a:t>
+              <a:t>10/24/2024</a:t>
             </a:fld>
             <a:endParaRPr lang="en-US" dirty="0"/>
           </a:p>
@@ -4182,7 +4187,7 @@
             <a:fld id="{B61BEF0D-F0BB-DE4B-95CE-6DB70DBA9567}" type="datetimeFigureOut">
               <a:rPr lang="en-US" dirty="0"/>
               <a:pPr/>
-              <a:t>10/23/2024</a:t>
+              <a:t>10/24/2024</a:t>
             </a:fld>
             <a:endParaRPr lang="en-US" dirty="0"/>
           </a:p>
@@ -4327,7 +4332,7 @@
             <a:fld id="{B61BEF0D-F0BB-DE4B-95CE-6DB70DBA9567}" type="datetimeFigureOut">
               <a:rPr lang="en-US" dirty="0"/>
               <a:pPr/>
-              <a:t>10/23/2024</a:t>
+              <a:t>10/24/2024</a:t>
             </a:fld>
             <a:endParaRPr lang="en-US" dirty="0"/>
           </a:p>
@@ -4449,7 +4454,7 @@
             <a:fld id="{B61BEF0D-F0BB-DE4B-95CE-6DB70DBA9567}" type="datetimeFigureOut">
               <a:rPr lang="en-US" dirty="0"/>
               <a:pPr/>
-              <a:t>10/23/2024</a:t>
+              <a:t>10/24/2024</a:t>
             </a:fld>
             <a:endParaRPr lang="en-US" dirty="0"/>
           </a:p>
@@ -4731,7 +4736,7 @@
             <a:fld id="{B61BEF0D-F0BB-DE4B-95CE-6DB70DBA9567}" type="datetimeFigureOut">
               <a:rPr lang="en-US" dirty="0"/>
               <a:pPr/>
-              <a:t>10/23/2024</a:t>
+              <a:t>10/24/2024</a:t>
             </a:fld>
             <a:endParaRPr lang="en-US" dirty="0"/>
           </a:p>
@@ -5052,7 +5057,7 @@
             <a:fld id="{B61BEF0D-F0BB-DE4B-95CE-6DB70DBA9567}" type="datetimeFigureOut">
               <a:rPr lang="en-US" dirty="0"/>
               <a:pPr/>
-              <a:t>10/23/2024</a:t>
+              <a:t>10/24/2024</a:t>
             </a:fld>
             <a:endParaRPr lang="en-US" dirty="0"/>
           </a:p>
@@ -5282,7 +5287,7 @@
             <a:fld id="{B61BEF0D-F0BB-DE4B-95CE-6DB70DBA9567}" type="datetimeFigureOut">
               <a:rPr lang="en-US" dirty="0"/>
               <a:pPr/>
-              <a:t>10/23/2024</a:t>
+              <a:t>10/24/2024</a:t>
             </a:fld>
             <a:endParaRPr lang="en-US" dirty="0"/>
           </a:p>
@@ -5889,10 +5894,10 @@
       </p:sp>
       <p:pic>
         <p:nvPicPr>
-          <p:cNvPr id="6" name="Picture 5">
+          <p:cNvPr id="12" name="Picture 11">
             <a:extLst>
               <a:ext uri="{FF2B5EF4-FFF2-40B4-BE49-F238E27FC236}">
-                <a16:creationId xmlns:a16="http://schemas.microsoft.com/office/drawing/2014/main" id="{C52A79FC-8BD7-7C61-3530-785BD36ADA9E}"/>
+                <a16:creationId xmlns:a16="http://schemas.microsoft.com/office/drawing/2014/main" id="{678476C1-4312-8E49-6E17-3D7B59283138}"/>
               </a:ext>
             </a:extLst>
           </p:cNvPr>
@@ -5909,63 +5914,14 @@
         </p:blipFill>
         <p:spPr>
           <a:xfrm>
-            <a:off x="1707860" y="0"/>
-            <a:ext cx="8776279" cy="6858000"/>
+            <a:off x="1587323" y="0"/>
+            <a:ext cx="9017353" cy="6858000"/>
           </a:xfrm>
           <a:prstGeom prst="rect">
             <a:avLst/>
           </a:prstGeom>
         </p:spPr>
       </p:pic>
-      <p:sp>
-        <p:nvSpPr>
-          <p:cNvPr id="7" name="TextBox 6">
-            <a:extLst>
-              <a:ext uri="{FF2B5EF4-FFF2-40B4-BE49-F238E27FC236}">
-                <a16:creationId xmlns:a16="http://schemas.microsoft.com/office/drawing/2014/main" id="{07EC400A-FC93-4417-F3D7-DB99FFB48E5F}"/>
-              </a:ext>
-            </a:extLst>
-          </p:cNvPr>
-          <p:cNvSpPr txBox="1"/>
-          <p:nvPr/>
-        </p:nvSpPr>
-        <p:spPr>
-          <a:xfrm>
-            <a:off x="8277679" y="6351704"/>
-            <a:ext cx="1972015" cy="400110"/>
-          </a:xfrm>
-          <a:prstGeom prst="rect">
-            <a:avLst/>
-          </a:prstGeom>
-          <a:noFill/>
-        </p:spPr>
-        <p:txBody>
-          <a:bodyPr wrap="none" rtlCol="0">
-            <a:spAutoFit/>
-          </a:bodyPr>
-          <a:lstStyle/>
-          <a:p>
-            <a:r>
-              <a:rPr lang="en-CA" sz="1000" dirty="0">
-                <a:solidFill>
-                  <a:schemeClr val="bg1"/>
-                </a:solidFill>
-              </a:rPr>
-              <a:t>inner line color based on database</a:t>
-            </a:r>
-          </a:p>
-          <a:p>
-            <a:r>
-              <a:rPr lang="en-CA" sz="1000" dirty="0">
-                <a:solidFill>
-                  <a:schemeClr val="bg1"/>
-                </a:solidFill>
-              </a:rPr>
-              <a:t>due to overlaps</a:t>
-            </a:r>
-          </a:p>
-        </p:txBody>
-      </p:sp>
     </p:spTree>
     <p:extLst>
       <p:ext uri="{BB962C8B-B14F-4D97-AF65-F5344CB8AC3E}">

</xml_diff>